<commit_message>
Upload 4 may 17
</commit_message>
<xml_diff>
--- a/Flowchart.pptx
+++ b/Flowchart.pptx
@@ -5556,7 +5556,7 @@
           <a:p>
             <a:fld id="{1160EA64-D806-43AC-9DF2-F8C432F32B4C}" type="datetimeFigureOut">
               <a:rPr lang="en-US" dirty="0"/>
-              <a:t>25-Apr-17</a:t>
+              <a:t>04-May-17</a:t>
             </a:fld>
             <a:endParaRPr lang="en-US" dirty="0"/>
           </a:p>
@@ -5722,7 +5722,7 @@
           <a:p>
             <a:fld id="{E9F9C37B-1D36-470B-8223-D6C91242EC14}" type="datetimeFigureOut">
               <a:rPr lang="en-US" dirty="0"/>
-              <a:t>25-Apr-17</a:t>
+              <a:t>04-May-17</a:t>
             </a:fld>
             <a:endParaRPr lang="en-US" dirty="0"/>
           </a:p>
@@ -5897,7 +5897,7 @@
           <a:p>
             <a:fld id="{67C6F52A-A82B-47A2-A83A-8C4C91F2D59F}" type="datetimeFigureOut">
               <a:rPr lang="en-US" dirty="0"/>
-              <a:t>25-Apr-17</a:t>
+              <a:t>04-May-17</a:t>
             </a:fld>
             <a:endParaRPr lang="en-US" dirty="0"/>
           </a:p>
@@ -6062,7 +6062,7 @@
           <a:p>
             <a:fld id="{F070A7B3-6521-4DCA-87E5-044747A908C1}" type="datetimeFigureOut">
               <a:rPr lang="en-US" dirty="0"/>
-              <a:t>25-Apr-17</a:t>
+              <a:t>04-May-17</a:t>
             </a:fld>
             <a:endParaRPr lang="en-US" dirty="0"/>
           </a:p>
@@ -6326,7 +6326,7 @@
           <a:p>
             <a:fld id="{1160EA64-D806-43AC-9DF2-F8C432F32B4C}" type="datetimeFigureOut">
               <a:rPr lang="en-US" dirty="0"/>
-              <a:t>25-Apr-17</a:t>
+              <a:t>04-May-17</a:t>
             </a:fld>
             <a:endParaRPr lang="en-US" dirty="0"/>
           </a:p>
@@ -6554,7 +6554,7 @@
           <a:p>
             <a:fld id="{AB134690-1557-4C89-A502-4959FE7FAD70}" type="datetimeFigureOut">
               <a:rPr lang="en-US" dirty="0"/>
-              <a:t>25-Apr-17</a:t>
+              <a:t>04-May-17</a:t>
             </a:fld>
             <a:endParaRPr lang="en-US" dirty="0"/>
           </a:p>
@@ -6908,7 +6908,7 @@
           <a:p>
             <a:fld id="{4F7D4976-E339-4826-83B7-FBD03F55ECF8}" type="datetimeFigureOut">
               <a:rPr lang="en-US" dirty="0"/>
-              <a:t>25-Apr-17</a:t>
+              <a:t>04-May-17</a:t>
             </a:fld>
             <a:endParaRPr lang="en-US" dirty="0"/>
           </a:p>
@@ -7044,7 +7044,7 @@
           <a:p>
             <a:fld id="{E1037C31-9E7A-4F99-8774-A0E530DE1A42}" type="datetimeFigureOut">
               <a:rPr lang="en-US" dirty="0"/>
-              <a:t>25-Apr-17</a:t>
+              <a:t>04-May-17</a:t>
             </a:fld>
             <a:endParaRPr lang="en-US" dirty="0"/>
           </a:p>
@@ -7134,7 +7134,7 @@
           <a:p>
             <a:fld id="{C278504F-A551-4DE0-9316-4DCD1D8CC752}" type="datetimeFigureOut">
               <a:rPr lang="en-US" dirty="0"/>
-              <a:t>25-Apr-17</a:t>
+              <a:t>04-May-17</a:t>
             </a:fld>
             <a:endParaRPr lang="en-US" dirty="0"/>
           </a:p>
@@ -7486,7 +7486,7 @@
           <a:p>
             <a:fld id="{D1BE4249-C0D0-4B06-8692-E8BB871AF643}" type="datetimeFigureOut">
               <a:rPr lang="en-US" dirty="0"/>
-              <a:t>25-Apr-17</a:t>
+              <a:t>04-May-17</a:t>
             </a:fld>
             <a:endParaRPr lang="en-US" dirty="0"/>
           </a:p>
@@ -7838,7 +7838,7 @@
           <a:p>
             <a:fld id="{042B0DB6-F5C7-45FB-8CF3-31B45F9C2DAC}" type="datetimeFigureOut">
               <a:rPr lang="en-US" dirty="0"/>
-              <a:t>25-Apr-17</a:t>
+              <a:t>04-May-17</a:t>
             </a:fld>
             <a:endParaRPr lang="en-US" dirty="0"/>
           </a:p>
@@ -8074,7 +8074,7 @@
           <a:p>
             <a:fld id="{1160EA64-D806-43AC-9DF2-F8C432F32B4C}" type="datetimeFigureOut">
               <a:rPr lang="en-US" dirty="0"/>
-              <a:t>25-Apr-17</a:t>
+              <a:t>04-May-17</a:t>
             </a:fld>
             <a:endParaRPr lang="en-US" dirty="0"/>
           </a:p>
@@ -9097,8 +9097,8 @@
         </p:nvCxnSpPr>
         <p:spPr>
           <a:xfrm>
-            <a:off x="1384672" y="2621430"/>
-            <a:ext cx="6744" cy="798603"/>
+            <a:off x="1384672" y="2635624"/>
+            <a:ext cx="6744" cy="784409"/>
           </a:xfrm>
           <a:prstGeom prst="straightConnector1">
             <a:avLst/>
@@ -9130,8 +9130,8 @@
         </p:nvCxnSpPr>
         <p:spPr>
           <a:xfrm flipV="1">
-            <a:off x="1384672" y="2576208"/>
-            <a:ext cx="9381527" cy="57455"/>
+            <a:off x="1366657" y="2576210"/>
+            <a:ext cx="9399542" cy="59414"/>
           </a:xfrm>
           <a:prstGeom prst="line">
             <a:avLst/>
@@ -9265,8 +9265,8 @@
         </p:nvCxnSpPr>
         <p:spPr>
           <a:xfrm>
-            <a:off x="8495668" y="2606366"/>
-            <a:ext cx="5209" cy="791547"/>
+            <a:off x="8496506" y="2576210"/>
+            <a:ext cx="4371" cy="821703"/>
           </a:xfrm>
           <a:prstGeom prst="straightConnector1">
             <a:avLst/>
@@ -9385,14 +9385,12 @@
       <p:cxnSp>
         <p:nvCxnSpPr>
           <p:cNvPr id="22" name="Straight Arrow Connector 21"/>
-          <p:cNvCxnSpPr>
-            <a:endCxn id="14" idx="0"/>
-          </p:cNvCxnSpPr>
+          <p:cNvCxnSpPr/>
           <p:nvPr/>
         </p:nvCxnSpPr>
         <p:spPr>
           <a:xfrm>
-            <a:off x="10751670" y="2579321"/>
+            <a:off x="10751669" y="2576210"/>
             <a:ext cx="1" cy="795508"/>
           </a:xfrm>
           <a:prstGeom prst="straightConnector1">

</xml_diff>